<commit_message>
updated bib of presentation
</commit_message>
<xml_diff>
--- a/presentation_final.pptx
+++ b/presentation_final.pptx
@@ -3792,31 +3792,173 @@
         </p:nvSpPr>
         <p:spPr/>
         <p:txBody>
-          <a:bodyPr/>
+          <a:bodyPr>
+            <a:normAutofit/>
+          </a:bodyPr>
           <a:lstStyle/>
           <a:p>
             <a:r>
-              <a:rPr lang="en-US" dirty="0" smtClean="0"/>
-              <a:t>Book</a:t>
-            </a:r>
-          </a:p>
-          <a:p>
-            <a:r>
-              <a:rPr lang="en-US" dirty="0" smtClean="0"/>
-              <a:t>Paper</a:t>
-            </a:r>
-          </a:p>
-          <a:p>
-            <a:r>
-              <a:rPr lang="en-US" dirty="0" smtClean="0"/>
-              <a:t>Wikipedia</a:t>
-            </a:r>
-          </a:p>
-          <a:p>
-            <a:endParaRPr lang="en-US" dirty="0" smtClean="0"/>
-          </a:p>
-          <a:p>
-            <a:endParaRPr lang="en-US" dirty="0"/>
+              <a:rPr lang="en-US" sz="1600" dirty="0"/>
+              <a:t>Daniel </a:t>
+            </a:r>
+            <a:r>
+              <a:rPr lang="en-US" sz="1600" dirty="0" err="1"/>
+              <a:t>Jurafsky</a:t>
+            </a:r>
+            <a:r>
+              <a:rPr lang="en-US" sz="1600" dirty="0"/>
+              <a:t> and James H. Martin. 2009. Speech and Language Processing (2nd Edition). Prentice-Hall, Inc., Upper Saddle River, NJ, USA</a:t>
+            </a:r>
+            <a:r>
+              <a:rPr lang="en-US" sz="1600" dirty="0" smtClean="0"/>
+              <a:t>.</a:t>
+            </a:r>
+          </a:p>
+          <a:p>
+            <a:r>
+              <a:rPr lang="en-US" sz="1600" dirty="0" smtClean="0"/>
+              <a:t>Andrew </a:t>
+            </a:r>
+            <a:r>
+              <a:rPr lang="en-US" sz="1600" dirty="0"/>
+              <a:t>McCallum, </a:t>
+            </a:r>
+            <a:r>
+              <a:rPr lang="en-US" sz="1600" dirty="0" err="1" smtClean="0"/>
+              <a:t>Dayne</a:t>
+            </a:r>
+            <a:r>
+              <a:rPr lang="en-US" sz="1600" dirty="0" smtClean="0"/>
+              <a:t> </a:t>
+            </a:r>
+            <a:r>
+              <a:rPr lang="en-US" sz="1600" dirty="0" err="1"/>
+              <a:t>Freitag</a:t>
+            </a:r>
+            <a:r>
+              <a:rPr lang="en-US" sz="1600" dirty="0"/>
+              <a:t>, and </a:t>
+            </a:r>
+            <a:r>
+              <a:rPr lang="en-US" sz="1600" dirty="0" smtClean="0"/>
+              <a:t>Fernando </a:t>
+            </a:r>
+            <a:r>
+              <a:rPr lang="en-US" sz="1600" dirty="0"/>
+              <a:t>Pereira. </a:t>
+            </a:r>
+            <a:r>
+              <a:rPr lang="en-US" sz="1600" dirty="0" smtClean="0"/>
+              <a:t>2000. Maximum </a:t>
+            </a:r>
+            <a:r>
+              <a:rPr lang="en-US" sz="1600" dirty="0"/>
+              <a:t>Entropy Markov Models for </a:t>
+            </a:r>
+            <a:r>
+              <a:rPr lang="en-US" sz="1600" dirty="0" smtClean="0"/>
+              <a:t>Information </a:t>
+            </a:r>
+            <a:r>
+              <a:rPr lang="en-US" sz="1600" dirty="0"/>
+              <a:t>Extraction and Segmentation. In Intl. Conf. on Machine </a:t>
+            </a:r>
+            <a:r>
+              <a:rPr lang="en-US" sz="1600" dirty="0" smtClean="0"/>
+              <a:t>Learning.</a:t>
+            </a:r>
+          </a:p>
+          <a:p>
+            <a:r>
+              <a:rPr lang="en-US" sz="1600" dirty="0" smtClean="0"/>
+              <a:t>W. N. Francis and H. </a:t>
+            </a:r>
+            <a:r>
+              <a:rPr lang="en-US" sz="1600" dirty="0" err="1" smtClean="0"/>
+              <a:t>Kucera</a:t>
+            </a:r>
+            <a:r>
+              <a:rPr lang="en-US" sz="1600" dirty="0" smtClean="0"/>
+              <a:t>. 1979. Brown </a:t>
+            </a:r>
+            <a:r>
+              <a:rPr lang="en-US" sz="1600" dirty="0"/>
+              <a:t>Corpus Manual. </a:t>
+            </a:r>
+            <a:r>
+              <a:rPr lang="en-US" sz="1600" dirty="0">
+                <a:hlinkClick r:id="rId2"/>
+              </a:rPr>
+              <a:t>http://www.hit.uib.no/icame/brown/</a:t>
+            </a:r>
+            <a:r>
+              <a:rPr lang="en-US" sz="1600" dirty="0" smtClean="0">
+                <a:hlinkClick r:id="rId2"/>
+              </a:rPr>
+              <a:t>bcm.html</a:t>
+            </a:r>
+            <a:endParaRPr lang="en-US" sz="1600" dirty="0" smtClean="0"/>
+          </a:p>
+          <a:p>
+            <a:r>
+              <a:rPr lang="en-US" sz="1600" dirty="0"/>
+              <a:t>Eugene </a:t>
+            </a:r>
+            <a:r>
+              <a:rPr lang="en-US" sz="1600" dirty="0" err="1"/>
+              <a:t>Charniak</a:t>
+            </a:r>
+            <a:r>
+              <a:rPr lang="en-US" sz="1600" dirty="0"/>
+              <a:t>, Don </a:t>
+            </a:r>
+            <a:r>
+              <a:rPr lang="en-US" sz="1600" dirty="0" err="1"/>
+              <a:t>Blaheta</a:t>
+            </a:r>
+            <a:r>
+              <a:rPr lang="en-US" sz="1600" dirty="0"/>
+              <a:t>, </a:t>
+            </a:r>
+            <a:r>
+              <a:rPr lang="en-US" sz="1600" dirty="0" err="1"/>
+              <a:t>Niyu</a:t>
+            </a:r>
+            <a:r>
+              <a:rPr lang="en-US" sz="1600" dirty="0"/>
+              <a:t> </a:t>
+            </a:r>
+            <a:r>
+              <a:rPr lang="en-US" sz="1600" dirty="0" err="1"/>
+              <a:t>Ge</a:t>
+            </a:r>
+            <a:r>
+              <a:rPr lang="en-US" sz="1600" dirty="0"/>
+              <a:t>, Keith Hall, John Hale, </a:t>
+            </a:r>
+            <a:r>
+              <a:rPr lang="en-US" sz="1600" dirty="0" smtClean="0"/>
+              <a:t>and Mark Johnson. </a:t>
+            </a:r>
+            <a:r>
+              <a:rPr lang="en-US" sz="1600" dirty="0"/>
+              <a:t>2000. BLLIP 1987-89 WSJ Corpus Release </a:t>
+            </a:r>
+            <a:r>
+              <a:rPr lang="en-US" sz="1600" dirty="0" smtClean="0"/>
+              <a:t>1</a:t>
+            </a:r>
+            <a:r>
+              <a:rPr lang="en-US" sz="1600" dirty="0"/>
+              <a:t>. Philadelphia: Linguistic Data Consortium</a:t>
+            </a:r>
+            <a:endParaRPr lang="en-US" sz="1600" dirty="0" smtClean="0"/>
+          </a:p>
+          <a:p>
+            <a:endParaRPr lang="en-US" sz="1600" dirty="0" smtClean="0"/>
+          </a:p>
+          <a:p>
+            <a:endParaRPr lang="en-US" sz="1600" dirty="0"/>
           </a:p>
         </p:txBody>
       </p:sp>

</xml_diff>